<commit_message>
/ ‘sse/apache/index.html’ / ‘sse/apache/presentation.md’ / ‘sse/crypto/index.html’ / ‘sse/exim/index.html’ / ‘sse/firewalls/index.html’ / ‘sse/firewalls/presentation.md’ / ‘sse/index.html’ / ‘sse/intro/index.html’ / ‘sse/ldap/index.html’ / ‘sse/postfix/mailgateway-pt2.pptx’ / ‘sse/postfix/mailgateway-pt3.txt’ / ‘sse/virtualization/index.html’
</commit_message>
<xml_diff>
--- a/sse/postfix/mailgateway-pt2.pptx
+++ b/sse/postfix/mailgateway-pt2.pptx
@@ -16,6 +16,8 @@
     <p:sldId id="263" r:id="rId10"/>
     <p:sldId id="264" r:id="rId11"/>
     <p:sldId id="265" r:id="rId12"/>
+    <p:sldId id="273" r:id="rId13"/>
+    <p:sldId id="274" r:id="rId14"/>
   </p:sldIdLst>
   <p:sldSz cx="9144000" cy="6858000" type="screen4x3"/>
   <p:notesSz cx="6858000" cy="9144000"/>
@@ -3399,6 +3401,217 @@
     <p:extLst>
       <p:ext uri="{BB962C8B-B14F-4D97-AF65-F5344CB8AC3E}">
         <p14:creationId xmlns:p14="http://schemas.microsoft.com/office/powerpoint/2010/main" val="3332952049"/>
+      </p:ext>
+    </p:extLst>
+  </p:cSld>
+  <p:clrMapOvr>
+    <a:masterClrMapping/>
+  </p:clrMapOvr>
+</p:sld>
+</file>
+
+<file path=ppt/slides/slide12.xml><?xml version="1.0" encoding="utf-8"?>
+<p:sld xmlns:a="http://schemas.openxmlformats.org/drawingml/2006/main" xmlns:r="http://schemas.openxmlformats.org/officeDocument/2006/relationships" xmlns:p="http://schemas.openxmlformats.org/presentationml/2006/main">
+  <p:cSld>
+    <p:spTree>
+      <p:nvGrpSpPr>
+        <p:cNvPr id="1" name=""/>
+        <p:cNvGrpSpPr/>
+        <p:nvPr/>
+      </p:nvGrpSpPr>
+      <p:grpSpPr>
+        <a:xfrm>
+          <a:off x="0" y="0"/>
+          <a:ext cx="0" cy="0"/>
+          <a:chOff x="0" y="0"/>
+          <a:chExt cx="0" cy="0"/>
+        </a:xfrm>
+      </p:grpSpPr>
+      <p:sp>
+        <p:nvSpPr>
+          <p:cNvPr id="2" name="Title 1"/>
+          <p:cNvSpPr>
+            <a:spLocks noGrp="1"/>
+          </p:cNvSpPr>
+          <p:nvPr>
+            <p:ph type="title"/>
+          </p:nvPr>
+        </p:nvSpPr>
+        <p:spPr>
+          <a:xfrm>
+            <a:off x="191911" y="401638"/>
+            <a:ext cx="8229600" cy="1602140"/>
+          </a:xfrm>
+        </p:spPr>
+        <p:txBody>
+          <a:bodyPr>
+            <a:normAutofit/>
+          </a:bodyPr>
+          <a:lstStyle/>
+          <a:p>
+            <a:r>
+              <a:rPr lang="en-US" b="1" dirty="0" smtClean="0"/>
+              <a:t>Set your </a:t>
+            </a:r>
+            <a:r>
+              <a:rPr lang="en-US" b="1" dirty="0" err="1" smtClean="0"/>
+              <a:t>afnog</a:t>
+            </a:r>
+            <a:r>
+              <a:rPr lang="en-US" b="1" dirty="0" smtClean="0"/>
+              <a:t> email address to receive spam reports</a:t>
+            </a:r>
+            <a:endParaRPr lang="en-US" b="1" dirty="0"/>
+          </a:p>
+        </p:txBody>
+      </p:sp>
+      <p:pic>
+        <p:nvPicPr>
+          <p:cNvPr id="7" name="Picture 6" descr="Screen Shot 2016-05-30 at 4.26.37 PM.png"/>
+          <p:cNvPicPr>
+            <a:picLocks noChangeAspect="1"/>
+          </p:cNvPicPr>
+          <p:nvPr/>
+        </p:nvPicPr>
+        <p:blipFill>
+          <a:blip r:embed="rId2">
+            <a:extLst>
+              <a:ext uri="{28A0092B-C50C-407E-A947-70E740481C1C}">
+                <a14:useLocalDpi xmlns:a14="http://schemas.microsoft.com/office/drawing/2010/main" val="0"/>
+              </a:ext>
+            </a:extLst>
+          </a:blip>
+          <a:stretch>
+            <a:fillRect/>
+          </a:stretch>
+        </p:blipFill>
+        <p:spPr>
+          <a:xfrm>
+            <a:off x="328948" y="2681111"/>
+            <a:ext cx="8092563" cy="1306689"/>
+          </a:xfrm>
+          <a:prstGeom prst="rect">
+            <a:avLst/>
+          </a:prstGeom>
+        </p:spPr>
+      </p:pic>
+      <p:sp>
+        <p:nvSpPr>
+          <p:cNvPr id="8" name="TextBox 7"/>
+          <p:cNvSpPr txBox="1"/>
+          <p:nvPr/>
+        </p:nvSpPr>
+        <p:spPr>
+          <a:xfrm>
+            <a:off x="2723444" y="4953000"/>
+            <a:ext cx="3082895" cy="369332"/>
+          </a:xfrm>
+          <a:prstGeom prst="rect">
+            <a:avLst/>
+          </a:prstGeom>
+          <a:noFill/>
+        </p:spPr>
+        <p:txBody>
+          <a:bodyPr wrap="none" rtlCol="0">
+            <a:spAutoFit/>
+          </a:bodyPr>
+          <a:lstStyle/>
+          <a:p>
+            <a:r>
+              <a:rPr lang="en-US" b="1" dirty="0" err="1" smtClean="0"/>
+              <a:t>afnog@pcXX.sse.ws.afnog.org</a:t>
+            </a:r>
+            <a:endParaRPr lang="en-US" b="1" dirty="0"/>
+          </a:p>
+        </p:txBody>
+      </p:sp>
+    </p:spTree>
+    <p:extLst>
+      <p:ext uri="{BB962C8B-B14F-4D97-AF65-F5344CB8AC3E}">
+        <p14:creationId xmlns:p14="http://schemas.microsoft.com/office/powerpoint/2010/main" val="1871453773"/>
+      </p:ext>
+    </p:extLst>
+  </p:cSld>
+  <p:clrMapOvr>
+    <a:masterClrMapping/>
+  </p:clrMapOvr>
+</p:sld>
+</file>
+
+<file path=ppt/slides/slide13.xml><?xml version="1.0" encoding="utf-8"?>
+<p:sld xmlns:a="http://schemas.openxmlformats.org/drawingml/2006/main" xmlns:r="http://schemas.openxmlformats.org/officeDocument/2006/relationships" xmlns:p="http://schemas.openxmlformats.org/presentationml/2006/main">
+  <p:cSld>
+    <p:spTree>
+      <p:nvGrpSpPr>
+        <p:cNvPr id="1" name=""/>
+        <p:cNvGrpSpPr/>
+        <p:nvPr/>
+      </p:nvGrpSpPr>
+      <p:grpSpPr>
+        <a:xfrm>
+          <a:off x="0" y="0"/>
+          <a:ext cx="0" cy="0"/>
+          <a:chOff x="0" y="0"/>
+          <a:chExt cx="0" cy="0"/>
+        </a:xfrm>
+      </p:grpSpPr>
+      <p:sp>
+        <p:nvSpPr>
+          <p:cNvPr id="2" name="Title 1"/>
+          <p:cNvSpPr>
+            <a:spLocks noGrp="1"/>
+          </p:cNvSpPr>
+          <p:nvPr>
+            <p:ph type="title"/>
+          </p:nvPr>
+        </p:nvSpPr>
+        <p:spPr/>
+        <p:txBody>
+          <a:bodyPr/>
+          <a:lstStyle/>
+          <a:p>
+            <a:r>
+              <a:rPr lang="en-US" b="1" dirty="0" smtClean="0"/>
+              <a:t>End of installation</a:t>
+            </a:r>
+            <a:endParaRPr lang="en-US" b="1" dirty="0"/>
+          </a:p>
+        </p:txBody>
+      </p:sp>
+      <p:pic>
+        <p:nvPicPr>
+          <p:cNvPr id="5" name="Picture 4" descr="Screen Shot 2016-05-30 at 4.35.34 PM.png"/>
+          <p:cNvPicPr>
+            <a:picLocks noChangeAspect="1"/>
+          </p:cNvPicPr>
+          <p:nvPr/>
+        </p:nvPicPr>
+        <p:blipFill>
+          <a:blip r:embed="rId2">
+            <a:extLst>
+              <a:ext uri="{28A0092B-C50C-407E-A947-70E740481C1C}">
+                <a14:useLocalDpi xmlns:a14="http://schemas.microsoft.com/office/drawing/2010/main" val="0"/>
+              </a:ext>
+            </a:extLst>
+          </a:blip>
+          <a:stretch>
+            <a:fillRect/>
+          </a:stretch>
+        </p:blipFill>
+        <p:spPr>
+          <a:xfrm>
+            <a:off x="1244600" y="2540000"/>
+            <a:ext cx="6642100" cy="1778000"/>
+          </a:xfrm>
+          <a:prstGeom prst="rect">
+            <a:avLst/>
+          </a:prstGeom>
+        </p:spPr>
+      </p:pic>
+    </p:spTree>
+    <p:extLst>
+      <p:ext uri="{BB962C8B-B14F-4D97-AF65-F5344CB8AC3E}">
+        <p14:creationId xmlns:p14="http://schemas.microsoft.com/office/powerpoint/2010/main" val="125417170"/>
       </p:ext>
     </p:extLst>
   </p:cSld>

</xml_diff>

<commit_message>
/ ‘sse/apache/presentation.md’ / ‘sse/postfix/mailgateway-pt2.pdf’ / ‘sse/postfix/mailgateway-pt2.pptx’ / ‘sse/postfix/mailgateway-pt3.txt’ / ‘sse/postfix/postfix-mailgateway-debian.pdf’ / ‘sse/postfix/postfix-mailgateway-debian.ppt’ / ‘sse/postfix/postfix-mailgateway-debian.pptx’ / ‘sse/setup/lxc/index.html’ / ‘sse/virtualization/ganeti-exercise.html’
</commit_message>
<xml_diff>
--- a/sse/postfix/mailgateway-pt2.pptx
+++ b/sse/postfix/mailgateway-pt2.pptx
@@ -300,7 +300,7 @@
           <a:p>
             <a:fld id="{03950108-52B0-2342-B9DD-68BFB658BDA7}" type="datetimeFigureOut">
               <a:rPr lang="en-US" smtClean="0"/>
-              <a:t>31/05/16</a:t>
+              <a:t>01/06/16</a:t>
             </a:fld>
             <a:endParaRPr lang="en-US"/>
           </a:p>
@@ -470,7 +470,7 @@
           <a:p>
             <a:fld id="{03950108-52B0-2342-B9DD-68BFB658BDA7}" type="datetimeFigureOut">
               <a:rPr lang="en-US" smtClean="0"/>
-              <a:t>31/05/16</a:t>
+              <a:t>01/06/16</a:t>
             </a:fld>
             <a:endParaRPr lang="en-US"/>
           </a:p>
@@ -650,7 +650,7 @@
           <a:p>
             <a:fld id="{03950108-52B0-2342-B9DD-68BFB658BDA7}" type="datetimeFigureOut">
               <a:rPr lang="en-US" smtClean="0"/>
-              <a:t>31/05/16</a:t>
+              <a:t>01/06/16</a:t>
             </a:fld>
             <a:endParaRPr lang="en-US"/>
           </a:p>
@@ -820,7 +820,7 @@
           <a:p>
             <a:fld id="{03950108-52B0-2342-B9DD-68BFB658BDA7}" type="datetimeFigureOut">
               <a:rPr lang="en-US" smtClean="0"/>
-              <a:t>31/05/16</a:t>
+              <a:t>01/06/16</a:t>
             </a:fld>
             <a:endParaRPr lang="en-US"/>
           </a:p>
@@ -1066,7 +1066,7 @@
           <a:p>
             <a:fld id="{03950108-52B0-2342-B9DD-68BFB658BDA7}" type="datetimeFigureOut">
               <a:rPr lang="en-US" smtClean="0"/>
-              <a:t>31/05/16</a:t>
+              <a:t>01/06/16</a:t>
             </a:fld>
             <a:endParaRPr lang="en-US"/>
           </a:p>
@@ -1354,7 +1354,7 @@
           <a:p>
             <a:fld id="{03950108-52B0-2342-B9DD-68BFB658BDA7}" type="datetimeFigureOut">
               <a:rPr lang="en-US" smtClean="0"/>
-              <a:t>31/05/16</a:t>
+              <a:t>01/06/16</a:t>
             </a:fld>
             <a:endParaRPr lang="en-US"/>
           </a:p>
@@ -1776,7 +1776,7 @@
           <a:p>
             <a:fld id="{03950108-52B0-2342-B9DD-68BFB658BDA7}" type="datetimeFigureOut">
               <a:rPr lang="en-US" smtClean="0"/>
-              <a:t>31/05/16</a:t>
+              <a:t>01/06/16</a:t>
             </a:fld>
             <a:endParaRPr lang="en-US"/>
           </a:p>
@@ -1894,7 +1894,7 @@
           <a:p>
             <a:fld id="{03950108-52B0-2342-B9DD-68BFB658BDA7}" type="datetimeFigureOut">
               <a:rPr lang="en-US" smtClean="0"/>
-              <a:t>31/05/16</a:t>
+              <a:t>01/06/16</a:t>
             </a:fld>
             <a:endParaRPr lang="en-US"/>
           </a:p>
@@ -1989,7 +1989,7 @@
           <a:p>
             <a:fld id="{03950108-52B0-2342-B9DD-68BFB658BDA7}" type="datetimeFigureOut">
               <a:rPr lang="en-US" smtClean="0"/>
-              <a:t>31/05/16</a:t>
+              <a:t>01/06/16</a:t>
             </a:fld>
             <a:endParaRPr lang="en-US"/>
           </a:p>
@@ -2266,7 +2266,7 @@
           <a:p>
             <a:fld id="{03950108-52B0-2342-B9DD-68BFB658BDA7}" type="datetimeFigureOut">
               <a:rPr lang="en-US" smtClean="0"/>
-              <a:t>31/05/16</a:t>
+              <a:t>01/06/16</a:t>
             </a:fld>
             <a:endParaRPr lang="en-US"/>
           </a:p>
@@ -2519,7 +2519,7 @@
           <a:p>
             <a:fld id="{03950108-52B0-2342-B9DD-68BFB658BDA7}" type="datetimeFigureOut">
               <a:rPr lang="en-US" smtClean="0"/>
-              <a:t>31/05/16</a:t>
+              <a:t>01/06/16</a:t>
             </a:fld>
             <a:endParaRPr lang="en-US"/>
           </a:p>
@@ -2732,7 +2732,7 @@
           <a:p>
             <a:fld id="{03950108-52B0-2342-B9DD-68BFB658BDA7}" type="datetimeFigureOut">
               <a:rPr lang="en-US" smtClean="0"/>
-              <a:t>31/05/16</a:t>
+              <a:t>01/06/16</a:t>
             </a:fld>
             <a:endParaRPr lang="en-US"/>
           </a:p>
@@ -3124,7 +3124,15 @@
           <a:p>
             <a:r>
               <a:rPr lang="en-US" b="1" dirty="0" smtClean="0"/>
-              <a:t>Mail Gateway – Part 2</a:t>
+              <a:t>Email server</a:t>
+            </a:r>
+            <a:r>
+              <a:rPr lang="en-US" b="1" smtClean="0"/>
+              <a:t>/Email </a:t>
+            </a:r>
+            <a:r>
+              <a:rPr lang="en-US" b="1" dirty="0" smtClean="0"/>
+              <a:t>Gateway – Part 2</a:t>
             </a:r>
             <a:endParaRPr lang="en-US" b="1" dirty="0"/>
           </a:p>
@@ -3519,11 +3527,7 @@
           <a:p>
             <a:r>
               <a:rPr lang="en-US" b="1" dirty="0" err="1" smtClean="0"/>
-              <a:t>afnog</a:t>
-            </a:r>
-            <a:r>
-              <a:rPr lang="en-US" b="1" dirty="0" err="1" smtClean="0"/>
-              <a:t>@XXX.afnog.guru</a:t>
+              <a:t>afnog@XXX.afnog.guru</a:t>
             </a:r>
             <a:endParaRPr lang="en-US" b="1" dirty="0"/>
           </a:p>

</xml_diff>